<commit_message>
Update spc_display.pptx next plan
</commit_message>
<xml_diff>
--- a/PPT/spc_display.pptx
+++ b/PPT/spc_display.pptx
@@ -10789,7 +10789,7 @@
     <mc:Choice Requires="p14">
       <p:transition/>
     </mc:Choice>
-    <mc:Fallback xmlns:dsp="http://schemas.microsoft.com/office/drawing/2008/diagram" xmlns:dgm="http://schemas.openxmlformats.org/drawingml/2006/diagram" xmlns:c="http://schemas.openxmlformats.org/drawingml/2006/chart" xmlns="">
+    <mc:Fallback xmlns="" xmlns:c="http://schemas.openxmlformats.org/drawingml/2006/chart" xmlns:dgm="http://schemas.openxmlformats.org/drawingml/2006/diagram" xmlns:dsp="http://schemas.microsoft.com/office/drawing/2008/diagram">
       <p:transition/>
     </mc:Fallback>
   </mc:AlternateContent>
@@ -10976,7 +10976,7 @@
     <mc:Choice Requires="p14">
       <p:transition/>
     </mc:Choice>
-    <mc:Fallback xmlns:dsp="http://schemas.microsoft.com/office/drawing/2008/diagram" xmlns:dgm="http://schemas.openxmlformats.org/drawingml/2006/diagram" xmlns:c="http://schemas.openxmlformats.org/drawingml/2006/chart" xmlns="">
+    <mc:Fallback xmlns="" xmlns:c="http://schemas.openxmlformats.org/drawingml/2006/chart" xmlns:dgm="http://schemas.openxmlformats.org/drawingml/2006/diagram" xmlns:dsp="http://schemas.microsoft.com/office/drawing/2008/diagram">
       <p:transition/>
     </mc:Fallback>
   </mc:AlternateContent>
@@ -11162,7 +11162,7 @@
     <mc:Choice Requires="p14">
       <p:transition/>
     </mc:Choice>
-    <mc:Fallback xmlns:dsp="http://schemas.microsoft.com/office/drawing/2008/diagram" xmlns:dgm="http://schemas.openxmlformats.org/drawingml/2006/diagram" xmlns:c="http://schemas.openxmlformats.org/drawingml/2006/chart" xmlns="">
+    <mc:Fallback xmlns="" xmlns:c="http://schemas.openxmlformats.org/drawingml/2006/chart" xmlns:dgm="http://schemas.openxmlformats.org/drawingml/2006/diagram" xmlns:dsp="http://schemas.microsoft.com/office/drawing/2008/diagram">
       <p:transition/>
     </mc:Fallback>
   </mc:AlternateContent>
@@ -11295,7 +11295,7 @@
     <mc:Choice Requires="p14">
       <p:transition/>
     </mc:Choice>
-    <mc:Fallback xmlns:dsp="http://schemas.microsoft.com/office/drawing/2008/diagram" xmlns:dgm="http://schemas.openxmlformats.org/drawingml/2006/diagram" xmlns:c="http://schemas.openxmlformats.org/drawingml/2006/chart" xmlns="">
+    <mc:Fallback xmlns="" xmlns:c="http://schemas.openxmlformats.org/drawingml/2006/chart" xmlns:dgm="http://schemas.openxmlformats.org/drawingml/2006/diagram" xmlns:dsp="http://schemas.microsoft.com/office/drawing/2008/diagram">
       <p:transition/>
     </mc:Fallback>
   </mc:AlternateContent>
@@ -11605,7 +11605,7 @@
     <mc:Choice Requires="p14">
       <p:transition/>
     </mc:Choice>
-    <mc:Fallback xmlns:dsp="http://schemas.microsoft.com/office/drawing/2008/diagram" xmlns:dgm="http://schemas.openxmlformats.org/drawingml/2006/diagram" xmlns:c="http://schemas.openxmlformats.org/drawingml/2006/chart" xmlns="">
+    <mc:Fallback xmlns="" xmlns:c="http://schemas.openxmlformats.org/drawingml/2006/chart" xmlns:dgm="http://schemas.openxmlformats.org/drawingml/2006/diagram" xmlns:dsp="http://schemas.microsoft.com/office/drawing/2008/diagram">
       <p:transition/>
     </mc:Fallback>
   </mc:AlternateContent>
@@ -11796,7 +11796,7 @@
     <mc:Choice Requires="p14">
       <p:transition/>
     </mc:Choice>
-    <mc:Fallback xmlns:dsp="http://schemas.microsoft.com/office/drawing/2008/diagram" xmlns:dgm="http://schemas.openxmlformats.org/drawingml/2006/diagram" xmlns:c="http://schemas.openxmlformats.org/drawingml/2006/chart" xmlns="">
+    <mc:Fallback xmlns="" xmlns:c="http://schemas.openxmlformats.org/drawingml/2006/chart" xmlns:dgm="http://schemas.openxmlformats.org/drawingml/2006/diagram" xmlns:dsp="http://schemas.microsoft.com/office/drawing/2008/diagram">
       <p:transition/>
     </mc:Fallback>
   </mc:AlternateContent>
@@ -12176,8 +12176,13 @@
             </a:r>
             <a:r>
               <a:rPr lang="en-US" altLang="ko-KR" dirty="0"/>
-              <a:t>)</a:t>
-            </a:r>
+              <a:t>), </a:t>
+            </a:r>
+            <a:r>
+              <a:rPr lang="ko-KR" altLang="en-US" dirty="0"/>
+              <a:t>별도 저장 및 프린트 기능 추가</a:t>
+            </a:r>
+            <a:endParaRPr lang="en-US" altLang="ko-KR" dirty="0"/>
           </a:p>
           <a:p>
             <a:endParaRPr lang="en-US" altLang="ko-KR" dirty="0"/>
@@ -12195,7 +12200,7 @@
           <a:p>
             <a:r>
               <a:rPr lang="ko-KR" altLang="en-US" dirty="0"/>
-              <a:t>프린트 편하도록 기능 추가</a:t>
+              <a:t>시험일로부터 복습 계획을 역산하는 기능 추가</a:t>
             </a:r>
             <a:endParaRPr lang="en-US" altLang="ko-KR" dirty="0"/>
           </a:p>
@@ -12334,7 +12339,7 @@
     <mc:Choice Requires="p14">
       <p:transition/>
     </mc:Choice>
-    <mc:Fallback xmlns:dsp="http://schemas.microsoft.com/office/drawing/2008/diagram" xmlns:dgm="http://schemas.openxmlformats.org/drawingml/2006/diagram" xmlns:c="http://schemas.openxmlformats.org/drawingml/2006/chart" xmlns="">
+    <mc:Fallback xmlns="" xmlns:c="http://schemas.openxmlformats.org/drawingml/2006/chart" xmlns:dgm="http://schemas.openxmlformats.org/drawingml/2006/diagram" xmlns:dsp="http://schemas.microsoft.com/office/drawing/2008/diagram">
       <p:transition/>
     </mc:Fallback>
   </mc:AlternateContent>

</xml_diff>

<commit_message>
Update spc_display.pptx program structure inputs
</commit_message>
<xml_diff>
--- a/PPT/spc_display.pptx
+++ b/PPT/spc_display.pptx
@@ -276,7 +276,7 @@
             <a:fld id="{940A130E-E3B8-4EBE-931F-81B26B8448AA}" type="datetime1">
               <a:rPr lang="ko-KR" altLang="en-US" smtClean="0"/>
               <a:pPr/>
-              <a:t>2023-08-18</a:t>
+              <a:t>2023-08-20</a:t>
             </a:fld>
             <a:endParaRPr lang="ko-KR" altLang="en-US"/>
           </a:p>
@@ -448,7 +448,7 @@
             <a:fld id="{D422D86A-5F52-4165-8473-F1B836277586}" type="datetime1">
               <a:rPr lang="ko-KR" altLang="en-US" smtClean="0"/>
               <a:pPr/>
-              <a:t>2023-08-18</a:t>
+              <a:t>2023-08-20</a:t>
             </a:fld>
             <a:endParaRPr lang="ko-KR" altLang="en-US"/>
           </a:p>
@@ -631,7 +631,7 @@
             <a:fld id="{D422D86A-5F52-4165-8473-F1B836277586}" type="datetime1">
               <a:rPr lang="ko-KR" altLang="en-US" smtClean="0"/>
               <a:pPr/>
-              <a:t>2023-08-18</a:t>
+              <a:t>2023-08-20</a:t>
             </a:fld>
             <a:endParaRPr lang="ko-KR" altLang="en-US"/>
           </a:p>
@@ -969,7 +969,7 @@
             <a:fld id="{940A130E-E3B8-4EBE-931F-81B26B8448AA}" type="datetime1">
               <a:rPr lang="ko-KR" altLang="en-US" smtClean="0"/>
               <a:pPr/>
-              <a:t>2023-08-18</a:t>
+              <a:t>2023-08-20</a:t>
             </a:fld>
             <a:endParaRPr lang="ko-KR" altLang="en-US"/>
           </a:p>
@@ -1285,7 +1285,7 @@
             <a:fld id="{D422D86A-5F52-4165-8473-F1B836277586}" type="datetime1">
               <a:rPr lang="ko-KR" altLang="en-US" smtClean="0"/>
               <a:pPr/>
-              <a:t>2023-08-18</a:t>
+              <a:t>2023-08-20</a:t>
             </a:fld>
             <a:endParaRPr lang="ko-KR" altLang="en-US"/>
           </a:p>
@@ -1677,7 +1677,7 @@
             <a:fld id="{60728D28-603B-4EFC-80F8-17E5E9107035}" type="datetime1">
               <a:rPr lang="ko-KR" altLang="en-US" smtClean="0"/>
               <a:pPr/>
-              <a:t>2023-08-18</a:t>
+              <a:t>2023-08-20</a:t>
             </a:fld>
             <a:endParaRPr lang="ko-KR" altLang="en-US"/>
           </a:p>
@@ -2055,7 +2055,7 @@
             <a:fld id="{D422D86A-5F52-4165-8473-F1B836277586}" type="datetime1">
               <a:rPr lang="ko-KR" altLang="en-US" smtClean="0"/>
               <a:pPr/>
-              <a:t>2023-08-18</a:t>
+              <a:t>2023-08-20</a:t>
             </a:fld>
             <a:endParaRPr lang="ko-KR" altLang="en-US"/>
           </a:p>
@@ -2564,7 +2564,7 @@
             <a:fld id="{D422D86A-5F52-4165-8473-F1B836277586}" type="datetime1">
               <a:rPr lang="ko-KR" altLang="en-US" smtClean="0"/>
               <a:pPr/>
-              <a:t>2023-08-18</a:t>
+              <a:t>2023-08-20</a:t>
             </a:fld>
             <a:endParaRPr lang="ko-KR" altLang="en-US"/>
           </a:p>
@@ -2824,7 +2824,7 @@
             <a:fld id="{5E0DA496-7307-4E8B-88DE-CB97B48BAB6F}" type="datetime1">
               <a:rPr lang="ko-KR" altLang="en-US" smtClean="0"/>
               <a:pPr/>
-              <a:t>2023-08-18</a:t>
+              <a:t>2023-08-20</a:t>
             </a:fld>
             <a:endParaRPr lang="ko-KR" altLang="en-US"/>
           </a:p>
@@ -2989,7 +2989,7 @@
             <a:fld id="{AD2EBAF6-36D0-4DD8-B695-D4C1B37E35D6}" type="datetime1">
               <a:rPr lang="ko-KR" altLang="en-US" smtClean="0"/>
               <a:pPr/>
-              <a:t>2023-08-18</a:t>
+              <a:t>2023-08-20</a:t>
             </a:fld>
             <a:endParaRPr lang="ko-KR" altLang="en-US"/>
           </a:p>
@@ -3381,7 +3381,7 @@
             <a:fld id="{D422D86A-5F52-4165-8473-F1B836277586}" type="datetime1">
               <a:rPr lang="ko-KR" altLang="en-US" smtClean="0"/>
               <a:pPr/>
-              <a:t>2023-08-18</a:t>
+              <a:t>2023-08-20</a:t>
             </a:fld>
             <a:endParaRPr lang="ko-KR" altLang="en-US"/>
           </a:p>
@@ -3554,7 +3554,7 @@
             <a:fld id="{4953836A-82A3-4C8B-9D31-CD724F3673ED}" type="datetime1">
               <a:rPr lang="ko-KR" altLang="en-US" smtClean="0"/>
               <a:pPr/>
-              <a:t>2023-08-18</a:t>
+              <a:t>2023-08-20</a:t>
             </a:fld>
             <a:endParaRPr lang="ko-KR" altLang="en-US"/>
           </a:p>
@@ -3965,7 +3965,7 @@
             <a:fld id="{D422D86A-5F52-4165-8473-F1B836277586}" type="datetime1">
               <a:rPr lang="ko-KR" altLang="en-US" smtClean="0"/>
               <a:pPr/>
-              <a:t>2023-08-18</a:t>
+              <a:t>2023-08-20</a:t>
             </a:fld>
             <a:endParaRPr lang="ko-KR" altLang="en-US"/>
           </a:p>
@@ -4377,7 +4377,7 @@
             <a:fld id="{D422D86A-5F52-4165-8473-F1B836277586}" type="datetime1">
               <a:rPr lang="ko-KR" altLang="en-US" smtClean="0"/>
               <a:pPr/>
-              <a:t>2023-08-18</a:t>
+              <a:t>2023-08-20</a:t>
             </a:fld>
             <a:endParaRPr lang="ko-KR" altLang="en-US"/>
           </a:p>
@@ -4716,7 +4716,7 @@
             <a:fld id="{D422D86A-5F52-4165-8473-F1B836277586}" type="datetime1">
               <a:rPr lang="ko-KR" altLang="en-US" smtClean="0"/>
               <a:pPr/>
-              <a:t>2023-08-18</a:t>
+              <a:t>2023-08-20</a:t>
             </a:fld>
             <a:endParaRPr lang="ko-KR" altLang="en-US"/>
           </a:p>
@@ -5124,7 +5124,7 @@
             <a:fld id="{D422D86A-5F52-4165-8473-F1B836277586}" type="datetime1">
               <a:rPr lang="ko-KR" altLang="en-US" smtClean="0"/>
               <a:pPr/>
-              <a:t>2023-08-18</a:t>
+              <a:t>2023-08-20</a:t>
             </a:fld>
             <a:endParaRPr lang="ko-KR" altLang="en-US"/>
           </a:p>
@@ -5695,7 +5695,7 @@
             <a:fld id="{D422D86A-5F52-4165-8473-F1B836277586}" type="datetime1">
               <a:rPr lang="ko-KR" altLang="en-US" smtClean="0"/>
               <a:pPr/>
-              <a:t>2023-08-18</a:t>
+              <a:t>2023-08-20</a:t>
             </a:fld>
             <a:endParaRPr lang="ko-KR" altLang="en-US"/>
           </a:p>
@@ -6379,7 +6379,7 @@
             <a:fld id="{D422D86A-5F52-4165-8473-F1B836277586}" type="datetime1">
               <a:rPr lang="ko-KR" altLang="en-US" smtClean="0"/>
               <a:pPr/>
-              <a:t>2023-08-18</a:t>
+              <a:t>2023-08-20</a:t>
             </a:fld>
             <a:endParaRPr lang="ko-KR" altLang="en-US"/>
           </a:p>
@@ -7295,7 +7295,7 @@
             <a:fld id="{D422D86A-5F52-4165-8473-F1B836277586}" type="datetime1">
               <a:rPr lang="ko-KR" altLang="en-US" smtClean="0"/>
               <a:pPr/>
-              <a:t>2023-08-18</a:t>
+              <a:t>2023-08-20</a:t>
             </a:fld>
             <a:endParaRPr lang="ko-KR" altLang="en-US"/>
           </a:p>
@@ -7611,7 +7611,7 @@
             <a:fld id="{D422D86A-5F52-4165-8473-F1B836277586}" type="datetime1">
               <a:rPr lang="ko-KR" altLang="en-US" smtClean="0"/>
               <a:pPr/>
-              <a:t>2023-08-18</a:t>
+              <a:t>2023-08-20</a:t>
             </a:fld>
             <a:endParaRPr lang="ko-KR" altLang="en-US"/>
           </a:p>
@@ -7878,7 +7878,7 @@
             <a:fld id="{D422D86A-5F52-4165-8473-F1B836277586}" type="datetime1">
               <a:rPr lang="ko-KR" altLang="en-US" smtClean="0"/>
               <a:pPr/>
-              <a:t>2023-08-18</a:t>
+              <a:t>2023-08-20</a:t>
             </a:fld>
             <a:endParaRPr lang="ko-KR" altLang="en-US"/>
           </a:p>
@@ -8146,7 +8146,7 @@
             <a:fld id="{60728D28-603B-4EFC-80F8-17E5E9107035}" type="datetime1">
               <a:rPr lang="ko-KR" altLang="en-US" smtClean="0"/>
               <a:pPr/>
-              <a:t>2023-08-18</a:t>
+              <a:t>2023-08-20</a:t>
             </a:fld>
             <a:endParaRPr lang="ko-KR" altLang="en-US"/>
           </a:p>
@@ -8380,7 +8380,7 @@
             <a:fld id="{D422D86A-5F52-4165-8473-F1B836277586}" type="datetime1">
               <a:rPr lang="ko-KR" altLang="en-US" smtClean="0"/>
               <a:pPr/>
-              <a:t>2023-08-18</a:t>
+              <a:t>2023-08-20</a:t>
             </a:fld>
             <a:endParaRPr lang="ko-KR" altLang="en-US"/>
           </a:p>
@@ -8730,7 +8730,7 @@
             <a:fld id="{D422D86A-5F52-4165-8473-F1B836277586}" type="datetime1">
               <a:rPr lang="ko-KR" altLang="en-US" smtClean="0"/>
               <a:pPr/>
-              <a:t>2023-08-18</a:t>
+              <a:t>2023-08-20</a:t>
             </a:fld>
             <a:endParaRPr lang="ko-KR" altLang="en-US"/>
           </a:p>
@@ -8851,7 +8851,7 @@
             <a:fld id="{5E0DA496-7307-4E8B-88DE-CB97B48BAB6F}" type="datetime1">
               <a:rPr lang="ko-KR" altLang="en-US" smtClean="0"/>
               <a:pPr/>
-              <a:t>2023-08-18</a:t>
+              <a:t>2023-08-20</a:t>
             </a:fld>
             <a:endParaRPr lang="ko-KR" altLang="en-US"/>
           </a:p>
@@ -8971,7 +8971,7 @@
             <a:fld id="{AD2EBAF6-36D0-4DD8-B695-D4C1B37E35D6}" type="datetime1">
               <a:rPr lang="ko-KR" altLang="en-US" smtClean="0"/>
               <a:pPr/>
-              <a:t>2023-08-18</a:t>
+              <a:t>2023-08-20</a:t>
             </a:fld>
             <a:endParaRPr lang="ko-KR" altLang="en-US"/>
           </a:p>
@@ -9257,7 +9257,7 @@
             <a:fld id="{D422D86A-5F52-4165-8473-F1B836277586}" type="datetime1">
               <a:rPr lang="ko-KR" altLang="en-US" smtClean="0"/>
               <a:pPr/>
-              <a:t>2023-08-18</a:t>
+              <a:t>2023-08-20</a:t>
             </a:fld>
             <a:endParaRPr lang="ko-KR" altLang="en-US"/>
           </a:p>
@@ -9524,7 +9524,7 @@
             <a:fld id="{D422D86A-5F52-4165-8473-F1B836277586}" type="datetime1">
               <a:rPr lang="ko-KR" altLang="en-US" smtClean="0"/>
               <a:pPr/>
-              <a:t>2023-08-18</a:t>
+              <a:t>2023-08-20</a:t>
             </a:fld>
             <a:endParaRPr lang="ko-KR" altLang="en-US"/>
           </a:p>
@@ -9741,7 +9741,7 @@
             <a:fld id="{D422D86A-5F52-4165-8473-F1B836277586}" type="datetime1">
               <a:rPr lang="ko-KR" altLang="en-US" smtClean="0"/>
               <a:pPr/>
-              <a:t>2023-08-18</a:t>
+              <a:t>2023-08-20</a:t>
             </a:fld>
             <a:endParaRPr lang="ko-KR" altLang="en-US"/>
           </a:p>
@@ -10304,7 +10304,7 @@
             <a:fld id="{D422D86A-5F52-4165-8473-F1B836277586}" type="datetime1">
               <a:rPr lang="ko-KR" altLang="en-US" smtClean="0"/>
               <a:pPr/>
-              <a:t>2023-08-18</a:t>
+              <a:t>2023-08-20</a:t>
             </a:fld>
             <a:endParaRPr lang="ko-KR" altLang="en-US"/>
           </a:p>
@@ -10789,7 +10789,7 @@
     <mc:Choice Requires="p14">
       <p:transition/>
     </mc:Choice>
-    <mc:Fallback xmlns="" xmlns:c="http://schemas.openxmlformats.org/drawingml/2006/chart" xmlns:dgm="http://schemas.openxmlformats.org/drawingml/2006/diagram" xmlns:dsp="http://schemas.microsoft.com/office/drawing/2008/diagram">
+    <mc:Fallback xmlns:dsp="http://schemas.microsoft.com/office/drawing/2008/diagram" xmlns:dgm="http://schemas.openxmlformats.org/drawingml/2006/diagram" xmlns:c="http://schemas.openxmlformats.org/drawingml/2006/chart" xmlns="">
       <p:transition/>
     </mc:Fallback>
   </mc:AlternateContent>
@@ -10976,7 +10976,7 @@
     <mc:Choice Requires="p14">
       <p:transition/>
     </mc:Choice>
-    <mc:Fallback xmlns="" xmlns:c="http://schemas.openxmlformats.org/drawingml/2006/chart" xmlns:dgm="http://schemas.openxmlformats.org/drawingml/2006/diagram" xmlns:dsp="http://schemas.microsoft.com/office/drawing/2008/diagram">
+    <mc:Fallback xmlns:dsp="http://schemas.microsoft.com/office/drawing/2008/diagram" xmlns:dgm="http://schemas.openxmlformats.org/drawingml/2006/diagram" xmlns:c="http://schemas.openxmlformats.org/drawingml/2006/chart" xmlns="">
       <p:transition/>
     </mc:Fallback>
   </mc:AlternateContent>
@@ -11162,7 +11162,7 @@
     <mc:Choice Requires="p14">
       <p:transition/>
     </mc:Choice>
-    <mc:Fallback xmlns="" xmlns:c="http://schemas.openxmlformats.org/drawingml/2006/chart" xmlns:dgm="http://schemas.openxmlformats.org/drawingml/2006/diagram" xmlns:dsp="http://schemas.microsoft.com/office/drawing/2008/diagram">
+    <mc:Fallback xmlns:dsp="http://schemas.microsoft.com/office/drawing/2008/diagram" xmlns:dgm="http://schemas.openxmlformats.org/drawingml/2006/diagram" xmlns:c="http://schemas.openxmlformats.org/drawingml/2006/chart" xmlns="">
       <p:transition/>
     </mc:Fallback>
   </mc:AlternateContent>
@@ -11295,7 +11295,7 @@
     <mc:Choice Requires="p14">
       <p:transition/>
     </mc:Choice>
-    <mc:Fallback xmlns="" xmlns:c="http://schemas.openxmlformats.org/drawingml/2006/chart" xmlns:dgm="http://schemas.openxmlformats.org/drawingml/2006/diagram" xmlns:dsp="http://schemas.microsoft.com/office/drawing/2008/diagram">
+    <mc:Fallback xmlns:dsp="http://schemas.microsoft.com/office/drawing/2008/diagram" xmlns:dgm="http://schemas.openxmlformats.org/drawingml/2006/diagram" xmlns:c="http://schemas.openxmlformats.org/drawingml/2006/chart" xmlns="">
       <p:transition/>
     </mc:Fallback>
   </mc:AlternateContent>
@@ -11434,7 +11434,7 @@
             </a:pPr>
             <a:r>
               <a:rPr lang="ko-KR" altLang="en-US" dirty="0"/>
-              <a:t>복습주기도 자유롭게 지정 가능</a:t>
+              <a:t>복습주기도 자유롭게 지정 가능하고</a:t>
             </a:r>
             <a:r>
               <a:rPr lang="en-US" altLang="ko-KR" dirty="0"/>
@@ -11442,7 +11442,7 @@
             </a:r>
             <a:r>
               <a:rPr lang="ko-KR" altLang="en-US" dirty="0"/>
-              <a:t>지정하지 않고 그냥 </a:t>
+              <a:t>지정 없이 그냥 </a:t>
             </a:r>
             <a:r>
               <a:rPr lang="ko-KR" altLang="en-US" dirty="0" err="1"/>
@@ -11452,10 +11452,7 @@
               <a:rPr lang="ko-KR" altLang="en-US" dirty="0"/>
               <a:t> 누르면</a:t>
             </a:r>
-            <a:r>
-              <a:rPr lang="en-US" altLang="ko-KR" dirty="0"/>
-              <a:t>?</a:t>
-            </a:r>
+            <a:endParaRPr lang="en-US" altLang="ko-KR" dirty="0"/>
           </a:p>
           <a:p>
             <a:pPr>
@@ -11605,7 +11602,7 @@
     <mc:Choice Requires="p14">
       <p:transition/>
     </mc:Choice>
-    <mc:Fallback xmlns="" xmlns:c="http://schemas.openxmlformats.org/drawingml/2006/chart" xmlns:dgm="http://schemas.openxmlformats.org/drawingml/2006/diagram" xmlns:dsp="http://schemas.microsoft.com/office/drawing/2008/diagram">
+    <mc:Fallback xmlns:dsp="http://schemas.microsoft.com/office/drawing/2008/diagram" xmlns:dgm="http://schemas.openxmlformats.org/drawingml/2006/diagram" xmlns:c="http://schemas.openxmlformats.org/drawingml/2006/chart" xmlns="">
       <p:transition/>
     </mc:Fallback>
   </mc:AlternateContent>
@@ -11796,7 +11793,7 @@
     <mc:Choice Requires="p14">
       <p:transition/>
     </mc:Choice>
-    <mc:Fallback xmlns="" xmlns:c="http://schemas.openxmlformats.org/drawingml/2006/chart" xmlns:dgm="http://schemas.openxmlformats.org/drawingml/2006/diagram" xmlns:dsp="http://schemas.microsoft.com/office/drawing/2008/diagram">
+    <mc:Fallback xmlns:dsp="http://schemas.microsoft.com/office/drawing/2008/diagram" xmlns:dgm="http://schemas.openxmlformats.org/drawingml/2006/diagram" xmlns:c="http://schemas.openxmlformats.org/drawingml/2006/chart" xmlns="">
       <p:transition/>
     </mc:Fallback>
   </mc:AlternateContent>
@@ -12339,7 +12336,7 @@
     <mc:Choice Requires="p14">
       <p:transition/>
     </mc:Choice>
-    <mc:Fallback xmlns="" xmlns:c="http://schemas.openxmlformats.org/drawingml/2006/chart" xmlns:dgm="http://schemas.openxmlformats.org/drawingml/2006/diagram" xmlns:dsp="http://schemas.microsoft.com/office/drawing/2008/diagram">
+    <mc:Fallback xmlns:dsp="http://schemas.microsoft.com/office/drawing/2008/diagram" xmlns:dgm="http://schemas.openxmlformats.org/drawingml/2006/diagram" xmlns:c="http://schemas.openxmlformats.org/drawingml/2006/chart" xmlns="">
       <p:transition/>
     </mc:Fallback>
   </mc:AlternateContent>

</xml_diff>

<commit_message>
Update spc_display.pptx add slide time
</commit_message>
<xml_diff>
--- a/PPT/spc_display.pptx
+++ b/PPT/spc_display.pptx
@@ -10785,14 +10785,7 @@
   <p:clrMapOvr>
     <a:masterClrMapping/>
   </p:clrMapOvr>
-  <mc:AlternateContent xmlns:mc="http://schemas.openxmlformats.org/markup-compatibility/2006" xmlns:p14="http://schemas.microsoft.com/office/powerpoint/2010/main">
-    <mc:Choice Requires="p14">
-      <p:transition/>
-    </mc:Choice>
-    <mc:Fallback xmlns:dsp="http://schemas.microsoft.com/office/drawing/2008/diagram" xmlns:dgm="http://schemas.openxmlformats.org/drawingml/2006/diagram" xmlns:c="http://schemas.openxmlformats.org/drawingml/2006/chart" xmlns="">
-      <p:transition/>
-    </mc:Fallback>
-  </mc:AlternateContent>
+  <p:transition advTm="10776"/>
 </p:sld>
 </file>
 
@@ -10972,14 +10965,7 @@
   <p:clrMapOvr>
     <a:masterClrMapping/>
   </p:clrMapOvr>
-  <mc:AlternateContent xmlns:mc="http://schemas.openxmlformats.org/markup-compatibility/2006" xmlns:p14="http://schemas.microsoft.com/office/powerpoint/2010/main">
-    <mc:Choice Requires="p14">
-      <p:transition/>
-    </mc:Choice>
-    <mc:Fallback xmlns:dsp="http://schemas.microsoft.com/office/drawing/2008/diagram" xmlns:dgm="http://schemas.openxmlformats.org/drawingml/2006/diagram" xmlns:c="http://schemas.openxmlformats.org/drawingml/2006/chart" xmlns="">
-      <p:transition/>
-    </mc:Fallback>
-  </mc:AlternateContent>
+  <p:transition advTm="11583"/>
 </p:sld>
 </file>
 
@@ -11158,14 +11144,7 @@
   <p:clrMapOvr>
     <a:masterClrMapping/>
   </p:clrMapOvr>
-  <mc:AlternateContent xmlns:mc="http://schemas.openxmlformats.org/markup-compatibility/2006" xmlns:p14="http://schemas.microsoft.com/office/powerpoint/2010/main">
-    <mc:Choice Requires="p14">
-      <p:transition/>
-    </mc:Choice>
-    <mc:Fallback xmlns:dsp="http://schemas.microsoft.com/office/drawing/2008/diagram" xmlns:dgm="http://schemas.openxmlformats.org/drawingml/2006/diagram" xmlns:c="http://schemas.openxmlformats.org/drawingml/2006/chart" xmlns="">
-      <p:transition/>
-    </mc:Fallback>
-  </mc:AlternateContent>
+  <p:transition advTm="9895"/>
 </p:sld>
 </file>
 
@@ -11291,14 +11270,7 @@
   <p:clrMapOvr>
     <a:masterClrMapping/>
   </p:clrMapOvr>
-  <mc:AlternateContent xmlns:mc="http://schemas.openxmlformats.org/markup-compatibility/2006" xmlns:p14="http://schemas.microsoft.com/office/powerpoint/2010/main">
-    <mc:Choice Requires="p14">
-      <p:transition/>
-    </mc:Choice>
-    <mc:Fallback xmlns:dsp="http://schemas.microsoft.com/office/drawing/2008/diagram" xmlns:dgm="http://schemas.openxmlformats.org/drawingml/2006/diagram" xmlns:c="http://schemas.openxmlformats.org/drawingml/2006/chart" xmlns="">
-      <p:transition/>
-    </mc:Fallback>
-  </mc:AlternateContent>
+  <p:transition advTm="9937"/>
 </p:sld>
 </file>
 
@@ -11598,14 +11570,7 @@
   <p:clrMapOvr>
     <a:masterClrMapping/>
   </p:clrMapOvr>
-  <mc:AlternateContent xmlns:mc="http://schemas.openxmlformats.org/markup-compatibility/2006" xmlns:p14="http://schemas.microsoft.com/office/powerpoint/2010/main">
-    <mc:Choice Requires="p14">
-      <p:transition/>
-    </mc:Choice>
-    <mc:Fallback xmlns:dsp="http://schemas.microsoft.com/office/drawing/2008/diagram" xmlns:dgm="http://schemas.openxmlformats.org/drawingml/2006/diagram" xmlns:c="http://schemas.openxmlformats.org/drawingml/2006/chart" xmlns="">
-      <p:transition/>
-    </mc:Fallback>
-  </mc:AlternateContent>
+  <p:transition advTm="10054"/>
 </p:sld>
 </file>
 
@@ -11789,14 +11754,7 @@
   <p:clrMapOvr>
     <a:masterClrMapping/>
   </p:clrMapOvr>
-  <mc:AlternateContent xmlns:mc="http://schemas.openxmlformats.org/markup-compatibility/2006" xmlns:p14="http://schemas.microsoft.com/office/powerpoint/2010/main">
-    <mc:Choice Requires="p14">
-      <p:transition/>
-    </mc:Choice>
-    <mc:Fallback xmlns:dsp="http://schemas.microsoft.com/office/drawing/2008/diagram" xmlns:dgm="http://schemas.openxmlformats.org/drawingml/2006/diagram" xmlns:c="http://schemas.openxmlformats.org/drawingml/2006/chart" xmlns="">
-      <p:transition/>
-    </mc:Fallback>
-  </mc:AlternateContent>
+  <p:transition advTm="9926"/>
 </p:sld>
 </file>
 
@@ -11862,6 +11820,14 @@
   <p:clrMapOvr>
     <a:masterClrMapping/>
   </p:clrMapOvr>
+  <mc:AlternateContent xmlns:mc="http://schemas.openxmlformats.org/markup-compatibility/2006">
+    <mc:Choice xmlns:p14="http://schemas.microsoft.com/office/powerpoint/2010/main" Requires="p14">
+      <p:transition spd="slow" p14:dur="2000" advTm="22812"/>
+    </mc:Choice>
+    <mc:Fallback>
+      <p:transition spd="slow" advTm="22812"/>
+    </mc:Fallback>
+  </mc:AlternateContent>
 </p:sld>
 </file>
 
@@ -12064,6 +12030,14 @@
   <p:clrMapOvr>
     <a:masterClrMapping/>
   </p:clrMapOvr>
+  <mc:AlternateContent xmlns:mc="http://schemas.openxmlformats.org/markup-compatibility/2006">
+    <mc:Choice xmlns:p14="http://schemas.microsoft.com/office/powerpoint/2010/main" Requires="p14">
+      <p:transition spd="slow" p14:dur="2000" advTm="11200"/>
+    </mc:Choice>
+    <mc:Fallback>
+      <p:transition spd="slow" advTm="11200"/>
+    </mc:Fallback>
+  </mc:AlternateContent>
 </p:sld>
 </file>
 
@@ -12213,6 +12187,14 @@
   <p:clrMapOvr>
     <a:masterClrMapping/>
   </p:clrMapOvr>
+  <mc:AlternateContent xmlns:mc="http://schemas.openxmlformats.org/markup-compatibility/2006">
+    <mc:Choice xmlns:p14="http://schemas.microsoft.com/office/powerpoint/2010/main" Requires="p14">
+      <p:transition spd="slow" p14:dur="2000" advTm="11222"/>
+    </mc:Choice>
+    <mc:Fallback>
+      <p:transition spd="slow" advTm="11222"/>
+    </mc:Fallback>
+  </mc:AlternateContent>
 </p:sld>
 </file>
 
@@ -12332,14 +12314,7 @@
   <p:clrMapOvr>
     <a:masterClrMapping/>
   </p:clrMapOvr>
-  <mc:AlternateContent xmlns:mc="http://schemas.openxmlformats.org/markup-compatibility/2006" xmlns:p14="http://schemas.microsoft.com/office/powerpoint/2010/main">
-    <mc:Choice Requires="p14">
-      <p:transition/>
-    </mc:Choice>
-    <mc:Fallback xmlns:dsp="http://schemas.microsoft.com/office/drawing/2008/diagram" xmlns:dgm="http://schemas.openxmlformats.org/drawingml/2006/diagram" xmlns:c="http://schemas.openxmlformats.org/drawingml/2006/chart" xmlns="">
-      <p:transition/>
-    </mc:Fallback>
-  </mc:AlternateContent>
+  <p:transition advTm="10838"/>
 </p:sld>
 </file>
 

</xml_diff>